<commit_message>
updates to table in background to reflect changes we made in riptide
</commit_message>
<xml_diff>
--- a/figures/figures.pptx
+++ b/figures/figures.pptx
@@ -199,7 +199,7 @@
           <a:p>
             <a:fld id="{3EA4D083-0E5E-FD49-A238-9DDAE47A1CE4}" type="datetimeFigureOut">
               <a:rPr lang="en-US" smtClean="0"/>
-              <a:t>5/11/22</a:t>
+              <a:t>8/24/22</a:t>
             </a:fld>
             <a:endParaRPr lang="en-US"/>
           </a:p>
@@ -681,7 +681,7 @@
           <a:p>
             <a:fld id="{CDAD7613-0936-5041-9449-3FE39304F5C6}" type="datetimeFigureOut">
               <a:rPr lang="en-US" smtClean="0"/>
-              <a:t>5/11/22</a:t>
+              <a:t>8/24/22</a:t>
             </a:fld>
             <a:endParaRPr lang="en-US"/>
           </a:p>
@@ -851,7 +851,7 @@
           <a:p>
             <a:fld id="{CDAD7613-0936-5041-9449-3FE39304F5C6}" type="datetimeFigureOut">
               <a:rPr lang="en-US" smtClean="0"/>
-              <a:t>5/11/22</a:t>
+              <a:t>8/24/22</a:t>
             </a:fld>
             <a:endParaRPr lang="en-US"/>
           </a:p>
@@ -1031,7 +1031,7 @@
           <a:p>
             <a:fld id="{CDAD7613-0936-5041-9449-3FE39304F5C6}" type="datetimeFigureOut">
               <a:rPr lang="en-US" smtClean="0"/>
-              <a:t>5/11/22</a:t>
+              <a:t>8/24/22</a:t>
             </a:fld>
             <a:endParaRPr lang="en-US"/>
           </a:p>
@@ -1201,7 +1201,7 @@
           <a:p>
             <a:fld id="{CDAD7613-0936-5041-9449-3FE39304F5C6}" type="datetimeFigureOut">
               <a:rPr lang="en-US" smtClean="0"/>
-              <a:t>5/11/22</a:t>
+              <a:t>8/24/22</a:t>
             </a:fld>
             <a:endParaRPr lang="en-US"/>
           </a:p>
@@ -1445,7 +1445,7 @@
           <a:p>
             <a:fld id="{CDAD7613-0936-5041-9449-3FE39304F5C6}" type="datetimeFigureOut">
               <a:rPr lang="en-US" smtClean="0"/>
-              <a:t>5/11/22</a:t>
+              <a:t>8/24/22</a:t>
             </a:fld>
             <a:endParaRPr lang="en-US"/>
           </a:p>
@@ -1677,7 +1677,7 @@
           <a:p>
             <a:fld id="{CDAD7613-0936-5041-9449-3FE39304F5C6}" type="datetimeFigureOut">
               <a:rPr lang="en-US" smtClean="0"/>
-              <a:t>5/11/22</a:t>
+              <a:t>8/24/22</a:t>
             </a:fld>
             <a:endParaRPr lang="en-US"/>
           </a:p>
@@ -2044,7 +2044,7 @@
           <a:p>
             <a:fld id="{CDAD7613-0936-5041-9449-3FE39304F5C6}" type="datetimeFigureOut">
               <a:rPr lang="en-US" smtClean="0"/>
-              <a:t>5/11/22</a:t>
+              <a:t>8/24/22</a:t>
             </a:fld>
             <a:endParaRPr lang="en-US"/>
           </a:p>
@@ -2162,7 +2162,7 @@
           <a:p>
             <a:fld id="{CDAD7613-0936-5041-9449-3FE39304F5C6}" type="datetimeFigureOut">
               <a:rPr lang="en-US" smtClean="0"/>
-              <a:t>5/11/22</a:t>
+              <a:t>8/24/22</a:t>
             </a:fld>
             <a:endParaRPr lang="en-US"/>
           </a:p>
@@ -2257,7 +2257,7 @@
           <a:p>
             <a:fld id="{CDAD7613-0936-5041-9449-3FE39304F5C6}" type="datetimeFigureOut">
               <a:rPr lang="en-US" smtClean="0"/>
-              <a:t>5/11/22</a:t>
+              <a:t>8/24/22</a:t>
             </a:fld>
             <a:endParaRPr lang="en-US"/>
           </a:p>
@@ -2534,7 +2534,7 @@
           <a:p>
             <a:fld id="{CDAD7613-0936-5041-9449-3FE39304F5C6}" type="datetimeFigureOut">
               <a:rPr lang="en-US" smtClean="0"/>
-              <a:t>5/11/22</a:t>
+              <a:t>8/24/22</a:t>
             </a:fld>
             <a:endParaRPr lang="en-US"/>
           </a:p>
@@ -2791,7 +2791,7 @@
           <a:p>
             <a:fld id="{CDAD7613-0936-5041-9449-3FE39304F5C6}" type="datetimeFigureOut">
               <a:rPr lang="en-US" smtClean="0"/>
-              <a:t>5/11/22</a:t>
+              <a:t>8/24/22</a:t>
             </a:fld>
             <a:endParaRPr lang="en-US"/>
           </a:p>
@@ -3004,7 +3004,7 @@
           <a:p>
             <a:fld id="{CDAD7613-0936-5041-9449-3FE39304F5C6}" type="datetimeFigureOut">
               <a:rPr lang="en-US" smtClean="0"/>
-              <a:t>5/11/22</a:t>
+              <a:t>8/24/22</a:t>
             </a:fld>
             <a:endParaRPr lang="en-US"/>
           </a:p>
@@ -27993,9 +27993,8 @@
         </p:nvPicPr>
         <p:blipFill>
           <a:blip r:embed="rId2"/>
-          <a:stretch>
-            <a:fillRect/>
-          </a:stretch>
+          <a:srcRect/>
+          <a:stretch/>
         </p:blipFill>
         <p:spPr>
           <a:xfrm>
@@ -28021,8 +28020,8 @@
         </p:nvSpPr>
         <p:spPr>
           <a:xfrm>
-            <a:off x="4659639" y="5511978"/>
-            <a:ext cx="723522" cy="608602"/>
+            <a:off x="4659638" y="5511978"/>
+            <a:ext cx="730509" cy="608602"/>
           </a:xfrm>
           <a:prstGeom prst="rect">
             <a:avLst/>

</xml_diff>